<commit_message>
updated fig with new y-axis labels in column 2
</commit_message>
<xml_diff>
--- a/figures/FCM_biogeochemical_combined_figure.pptx
+++ b/figures/FCM_biogeochemical_combined_figure.pptx
@@ -243,7 +243,7 @@
           <a:p>
             <a:fld id="{9271927B-32CE-4344-9476-CF91E1910AEF}" type="datetimeFigureOut">
               <a:rPr lang="en-US" smtClean="0"/>
-              <a:t>10/29/20</a:t>
+              <a:t>10/25/22</a:t>
             </a:fld>
             <a:endParaRPr lang="en-US"/>
           </a:p>
@@ -413,7 +413,7 @@
           <a:p>
             <a:fld id="{9271927B-32CE-4344-9476-CF91E1910AEF}" type="datetimeFigureOut">
               <a:rPr lang="en-US" smtClean="0"/>
-              <a:t>10/29/20</a:t>
+              <a:t>10/25/22</a:t>
             </a:fld>
             <a:endParaRPr lang="en-US"/>
           </a:p>
@@ -593,7 +593,7 @@
           <a:p>
             <a:fld id="{9271927B-32CE-4344-9476-CF91E1910AEF}" type="datetimeFigureOut">
               <a:rPr lang="en-US" smtClean="0"/>
-              <a:t>10/29/20</a:t>
+              <a:t>10/25/22</a:t>
             </a:fld>
             <a:endParaRPr lang="en-US"/>
           </a:p>
@@ -763,7 +763,7 @@
           <a:p>
             <a:fld id="{9271927B-32CE-4344-9476-CF91E1910AEF}" type="datetimeFigureOut">
               <a:rPr lang="en-US" smtClean="0"/>
-              <a:t>10/29/20</a:t>
+              <a:t>10/25/22</a:t>
             </a:fld>
             <a:endParaRPr lang="en-US"/>
           </a:p>
@@ -1007,7 +1007,7 @@
           <a:p>
             <a:fld id="{9271927B-32CE-4344-9476-CF91E1910AEF}" type="datetimeFigureOut">
               <a:rPr lang="en-US" smtClean="0"/>
-              <a:t>10/29/20</a:t>
+              <a:t>10/25/22</a:t>
             </a:fld>
             <a:endParaRPr lang="en-US"/>
           </a:p>
@@ -1239,7 +1239,7 @@
           <a:p>
             <a:fld id="{9271927B-32CE-4344-9476-CF91E1910AEF}" type="datetimeFigureOut">
               <a:rPr lang="en-US" smtClean="0"/>
-              <a:t>10/29/20</a:t>
+              <a:t>10/25/22</a:t>
             </a:fld>
             <a:endParaRPr lang="en-US"/>
           </a:p>
@@ -1606,7 +1606,7 @@
           <a:p>
             <a:fld id="{9271927B-32CE-4344-9476-CF91E1910AEF}" type="datetimeFigureOut">
               <a:rPr lang="en-US" smtClean="0"/>
-              <a:t>10/29/20</a:t>
+              <a:t>10/25/22</a:t>
             </a:fld>
             <a:endParaRPr lang="en-US"/>
           </a:p>
@@ -1724,7 +1724,7 @@
           <a:p>
             <a:fld id="{9271927B-32CE-4344-9476-CF91E1910AEF}" type="datetimeFigureOut">
               <a:rPr lang="en-US" smtClean="0"/>
-              <a:t>10/29/20</a:t>
+              <a:t>10/25/22</a:t>
             </a:fld>
             <a:endParaRPr lang="en-US"/>
           </a:p>
@@ -1819,7 +1819,7 @@
           <a:p>
             <a:fld id="{9271927B-32CE-4344-9476-CF91E1910AEF}" type="datetimeFigureOut">
               <a:rPr lang="en-US" smtClean="0"/>
-              <a:t>10/29/20</a:t>
+              <a:t>10/25/22</a:t>
             </a:fld>
             <a:endParaRPr lang="en-US"/>
           </a:p>
@@ -2096,7 +2096,7 @@
           <a:p>
             <a:fld id="{9271927B-32CE-4344-9476-CF91E1910AEF}" type="datetimeFigureOut">
               <a:rPr lang="en-US" smtClean="0"/>
-              <a:t>10/29/20</a:t>
+              <a:t>10/25/22</a:t>
             </a:fld>
             <a:endParaRPr lang="en-US"/>
           </a:p>
@@ -2353,7 +2353,7 @@
           <a:p>
             <a:fld id="{9271927B-32CE-4344-9476-CF91E1910AEF}" type="datetimeFigureOut">
               <a:rPr lang="en-US" smtClean="0"/>
-              <a:t>10/29/20</a:t>
+              <a:t>10/25/22</a:t>
             </a:fld>
             <a:endParaRPr lang="en-US"/>
           </a:p>
@@ -2566,7 +2566,7 @@
           <a:p>
             <a:fld id="{9271927B-32CE-4344-9476-CF91E1910AEF}" type="datetimeFigureOut">
               <a:rPr lang="en-US" smtClean="0"/>
-              <a:t>10/29/20</a:t>
+              <a:t>10/25/22</a:t>
             </a:fld>
             <a:endParaRPr lang="en-US"/>
           </a:p>
@@ -2973,6 +2973,126 @@
       </p:grpSpPr>
       <p:pic>
         <p:nvPicPr>
+          <p:cNvPr id="12" name="Picture 11">
+            <a:extLst>
+              <a:ext uri="{FF2B5EF4-FFF2-40B4-BE49-F238E27FC236}">
+                <a16:creationId xmlns:a16="http://schemas.microsoft.com/office/drawing/2014/main" id="{B77EA942-F8B6-2F45-BCAD-2F3AC6747A14}"/>
+              </a:ext>
+            </a:extLst>
+          </p:cNvPr>
+          <p:cNvPicPr>
+            <a:picLocks noChangeAspect="1"/>
+          </p:cNvPicPr>
+          <p:nvPr/>
+        </p:nvPicPr>
+        <p:blipFill>
+          <a:blip r:embed="rId2"/>
+          <a:stretch>
+            <a:fillRect/>
+          </a:stretch>
+        </p:blipFill>
+        <p:spPr>
+          <a:xfrm>
+            <a:off x="4114800" y="7205472"/>
+            <a:ext cx="3657600" cy="1828800"/>
+          </a:xfrm>
+          <a:prstGeom prst="rect">
+            <a:avLst/>
+          </a:prstGeom>
+        </p:spPr>
+      </p:pic>
+      <p:pic>
+        <p:nvPicPr>
+          <p:cNvPr id="6" name="Picture 5">
+            <a:extLst>
+              <a:ext uri="{FF2B5EF4-FFF2-40B4-BE49-F238E27FC236}">
+                <a16:creationId xmlns:a16="http://schemas.microsoft.com/office/drawing/2014/main" id="{690B2E40-8E62-384F-93A9-E57DC2EB9055}"/>
+              </a:ext>
+            </a:extLst>
+          </p:cNvPr>
+          <p:cNvPicPr>
+            <a:picLocks noChangeAspect="1"/>
+          </p:cNvPicPr>
+          <p:nvPr/>
+        </p:nvPicPr>
+        <p:blipFill>
+          <a:blip r:embed="rId3"/>
+          <a:stretch>
+            <a:fillRect/>
+          </a:stretch>
+        </p:blipFill>
+        <p:spPr>
+          <a:xfrm>
+            <a:off x="4114800" y="5623561"/>
+            <a:ext cx="3657600" cy="1567543"/>
+          </a:xfrm>
+          <a:prstGeom prst="rect">
+            <a:avLst/>
+          </a:prstGeom>
+        </p:spPr>
+      </p:pic>
+      <p:pic>
+        <p:nvPicPr>
+          <p:cNvPr id="9" name="Picture 8">
+            <a:extLst>
+              <a:ext uri="{FF2B5EF4-FFF2-40B4-BE49-F238E27FC236}">
+                <a16:creationId xmlns:a16="http://schemas.microsoft.com/office/drawing/2014/main" id="{E14A4B28-B45E-2747-B89D-06E6E7AE24C7}"/>
+              </a:ext>
+            </a:extLst>
+          </p:cNvPr>
+          <p:cNvPicPr>
+            <a:picLocks noChangeAspect="1"/>
+          </p:cNvPicPr>
+          <p:nvPr/>
+        </p:nvPicPr>
+        <p:blipFill>
+          <a:blip r:embed="rId4"/>
+          <a:stretch>
+            <a:fillRect/>
+          </a:stretch>
+        </p:blipFill>
+        <p:spPr>
+          <a:xfrm>
+            <a:off x="4114800" y="2487168"/>
+            <a:ext cx="3657600" cy="1567543"/>
+          </a:xfrm>
+          <a:prstGeom prst="rect">
+            <a:avLst/>
+          </a:prstGeom>
+        </p:spPr>
+      </p:pic>
+      <p:pic>
+        <p:nvPicPr>
+          <p:cNvPr id="4" name="Picture 3">
+            <a:extLst>
+              <a:ext uri="{FF2B5EF4-FFF2-40B4-BE49-F238E27FC236}">
+                <a16:creationId xmlns:a16="http://schemas.microsoft.com/office/drawing/2014/main" id="{2E39FE0E-202F-C54A-A6A6-EA8F3FF7D86E}"/>
+              </a:ext>
+            </a:extLst>
+          </p:cNvPr>
+          <p:cNvPicPr>
+            <a:picLocks noChangeAspect="1"/>
+          </p:cNvPicPr>
+          <p:nvPr/>
+        </p:nvPicPr>
+        <p:blipFill>
+          <a:blip r:embed="rId5"/>
+          <a:stretch>
+            <a:fillRect/>
+          </a:stretch>
+        </p:blipFill>
+        <p:spPr>
+          <a:xfrm>
+            <a:off x="4114800" y="658368"/>
+            <a:ext cx="3657600" cy="1828800"/>
+          </a:xfrm>
+          <a:prstGeom prst="rect">
+            <a:avLst/>
+          </a:prstGeom>
+        </p:spPr>
+      </p:pic>
+      <p:pic>
+        <p:nvPicPr>
           <p:cNvPr id="37" name="Picture 36">
             <a:extLst>
               <a:ext uri="{FF2B5EF4-FFF2-40B4-BE49-F238E27FC236}">
@@ -2986,7 +3106,7 @@
           <p:nvPr/>
         </p:nvPicPr>
         <p:blipFill>
-          <a:blip r:embed="rId2"/>
+          <a:blip r:embed="rId6"/>
           <a:stretch>
             <a:fillRect/>
           </a:stretch>
@@ -3016,7 +3136,7 @@
           <p:nvPr/>
         </p:nvPicPr>
         <p:blipFill>
-          <a:blip r:embed="rId3"/>
+          <a:blip r:embed="rId7"/>
           <a:stretch>
             <a:fillRect/>
           </a:stretch>
@@ -3046,7 +3166,7 @@
           <p:nvPr/>
         </p:nvPicPr>
         <p:blipFill>
-          <a:blip r:embed="rId4"/>
+          <a:blip r:embed="rId8"/>
           <a:stretch>
             <a:fillRect/>
           </a:stretch>
@@ -3076,7 +3196,7 @@
           <p:nvPr/>
         </p:nvPicPr>
         <p:blipFill>
-          <a:blip r:embed="rId5"/>
+          <a:blip r:embed="rId9"/>
           <a:stretch>
             <a:fillRect/>
           </a:stretch>
@@ -3106,7 +3226,7 @@
           <p:nvPr/>
         </p:nvPicPr>
         <p:blipFill>
-          <a:blip r:embed="rId6"/>
+          <a:blip r:embed="rId10"/>
           <a:stretch>
             <a:fillRect/>
           </a:stretch>
@@ -3136,7 +3256,7 @@
           <p:nvPr/>
         </p:nvPicPr>
         <p:blipFill>
-          <a:blip r:embed="rId7"/>
+          <a:blip r:embed="rId11"/>
           <a:stretch>
             <a:fillRect/>
           </a:stretch>
@@ -3166,7 +3286,7 @@
           <p:nvPr/>
         </p:nvPicPr>
         <p:blipFill>
-          <a:blip r:embed="rId8"/>
+          <a:blip r:embed="rId12"/>
           <a:stretch>
             <a:fillRect/>
           </a:stretch>
@@ -3175,126 +3295,6 @@
           <a:xfrm>
             <a:off x="4114800" y="4069080"/>
             <a:ext cx="3657600" cy="1567543"/>
-          </a:xfrm>
-          <a:prstGeom prst="rect">
-            <a:avLst/>
-          </a:prstGeom>
-        </p:spPr>
-      </p:pic>
-      <p:pic>
-        <p:nvPicPr>
-          <p:cNvPr id="69" name="Picture 68">
-            <a:extLst>
-              <a:ext uri="{FF2B5EF4-FFF2-40B4-BE49-F238E27FC236}">
-                <a16:creationId xmlns:a16="http://schemas.microsoft.com/office/drawing/2014/main" id="{A7310EF3-BB22-4548-8E73-8454FA0F5778}"/>
-              </a:ext>
-            </a:extLst>
-          </p:cNvPr>
-          <p:cNvPicPr>
-            <a:picLocks noChangeAspect="1"/>
-          </p:cNvPicPr>
-          <p:nvPr/>
-        </p:nvPicPr>
-        <p:blipFill>
-          <a:blip r:embed="rId9"/>
-          <a:stretch>
-            <a:fillRect/>
-          </a:stretch>
-        </p:blipFill>
-        <p:spPr>
-          <a:xfrm>
-            <a:off x="4114800" y="2487168"/>
-            <a:ext cx="3657600" cy="1567543"/>
-          </a:xfrm>
-          <a:prstGeom prst="rect">
-            <a:avLst/>
-          </a:prstGeom>
-        </p:spPr>
-      </p:pic>
-      <p:pic>
-        <p:nvPicPr>
-          <p:cNvPr id="71" name="Picture 70">
-            <a:extLst>
-              <a:ext uri="{FF2B5EF4-FFF2-40B4-BE49-F238E27FC236}">
-                <a16:creationId xmlns:a16="http://schemas.microsoft.com/office/drawing/2014/main" id="{A7494FC4-5377-D84D-A6FD-CC6CB7475B55}"/>
-              </a:ext>
-            </a:extLst>
-          </p:cNvPr>
-          <p:cNvPicPr>
-            <a:picLocks noChangeAspect="1"/>
-          </p:cNvPicPr>
-          <p:nvPr/>
-        </p:nvPicPr>
-        <p:blipFill>
-          <a:blip r:embed="rId10"/>
-          <a:stretch>
-            <a:fillRect/>
-          </a:stretch>
-        </p:blipFill>
-        <p:spPr>
-          <a:xfrm>
-            <a:off x="4114800" y="5623560"/>
-            <a:ext cx="3657600" cy="1567543"/>
-          </a:xfrm>
-          <a:prstGeom prst="rect">
-            <a:avLst/>
-          </a:prstGeom>
-        </p:spPr>
-      </p:pic>
-      <p:pic>
-        <p:nvPicPr>
-          <p:cNvPr id="73" name="Picture 72">
-            <a:extLst>
-              <a:ext uri="{FF2B5EF4-FFF2-40B4-BE49-F238E27FC236}">
-                <a16:creationId xmlns:a16="http://schemas.microsoft.com/office/drawing/2014/main" id="{AA322AB7-AC57-664A-AADD-916EF4C58F7C}"/>
-              </a:ext>
-            </a:extLst>
-          </p:cNvPr>
-          <p:cNvPicPr>
-            <a:picLocks noChangeAspect="1"/>
-          </p:cNvPicPr>
-          <p:nvPr/>
-        </p:nvPicPr>
-        <p:blipFill>
-          <a:blip r:embed="rId11"/>
-          <a:stretch>
-            <a:fillRect/>
-          </a:stretch>
-        </p:blipFill>
-        <p:spPr>
-          <a:xfrm>
-            <a:off x="4114800" y="7205472"/>
-            <a:ext cx="3657600" cy="1828800"/>
-          </a:xfrm>
-          <a:prstGeom prst="rect">
-            <a:avLst/>
-          </a:prstGeom>
-        </p:spPr>
-      </p:pic>
-      <p:pic>
-        <p:nvPicPr>
-          <p:cNvPr id="75" name="Picture 74">
-            <a:extLst>
-              <a:ext uri="{FF2B5EF4-FFF2-40B4-BE49-F238E27FC236}">
-                <a16:creationId xmlns:a16="http://schemas.microsoft.com/office/drawing/2014/main" id="{CE6190FD-3C34-2F40-9D3D-32B71231DB42}"/>
-              </a:ext>
-            </a:extLst>
-          </p:cNvPr>
-          <p:cNvPicPr>
-            <a:picLocks noChangeAspect="1"/>
-          </p:cNvPicPr>
-          <p:nvPr/>
-        </p:nvPicPr>
-        <p:blipFill>
-          <a:blip r:embed="rId12"/>
-          <a:stretch>
-            <a:fillRect/>
-          </a:stretch>
-        </p:blipFill>
-        <p:spPr>
-          <a:xfrm>
-            <a:off x="4114800" y="658368"/>
-            <a:ext cx="3657600" cy="1828800"/>
           </a:xfrm>
           <a:prstGeom prst="rect">
             <a:avLst/>

</xml_diff>